<commit_message>
add custom stream source v2
</commit_message>
<xml_diff>
--- a/Spark_Custom_Stream_Sources_v2.pptx
+++ b/Spark_Custom_Stream_Sources_v2.pptx
@@ -5,7 +5,7 @@
     <p:sldMasterId id="2147483648" r:id="rId1"/>
   </p:sldMasterIdLst>
   <p:notesMasterIdLst>
-    <p:notesMasterId r:id="rId15"/>
+    <p:notesMasterId r:id="rId16"/>
   </p:notesMasterIdLst>
   <p:sldIdLst>
     <p:sldId id="257" r:id="rId2"/>
@@ -19,8 +19,9 @@
     <p:sldId id="289" r:id="rId10"/>
     <p:sldId id="290" r:id="rId11"/>
     <p:sldId id="291" r:id="rId12"/>
-    <p:sldId id="285" r:id="rId13"/>
-    <p:sldId id="270" r:id="rId14"/>
+    <p:sldId id="292" r:id="rId13"/>
+    <p:sldId id="285" r:id="rId14"/>
+    <p:sldId id="270" r:id="rId15"/>
   </p:sldIdLst>
   <p:sldSz cx="12192000" cy="6858000"/>
   <p:notesSz cx="6858000" cy="9144000"/>
@@ -3623,15 +3624,15 @@
               <a:t>  extends </a:t>
             </a:r>
             <a:r>
-              <a:rPr lang="en-US" dirty="0" err="1"/>
+              <a:rPr lang="en-US" b="1" dirty="0" err="1"/>
               <a:t>PartitionReader</a:t>
             </a:r>
             <a:r>
-              <a:rPr lang="en-US" dirty="0"/>
+              <a:rPr lang="en-US" b="1" dirty="0"/>
               <a:t>[</a:t>
             </a:r>
             <a:r>
-              <a:rPr lang="en-US" dirty="0" err="1"/>
+              <a:rPr lang="en-US" b="1" dirty="0" err="1"/>
               <a:t>InternalRow</a:t>
             </a:r>
             <a:r>
@@ -3795,6 +3796,218 @@
       </p:grpSpPr>
       <p:sp>
         <p:nvSpPr>
+          <p:cNvPr id="2" name="Прямоугольник 1"/>
+          <p:cNvSpPr/>
+          <p:nvPr/>
+        </p:nvSpPr>
+        <p:spPr>
+          <a:xfrm>
+            <a:off x="1108668" y="719521"/>
+            <a:ext cx="6096000" cy="2585323"/>
+          </a:xfrm>
+          <a:prstGeom prst="rect">
+            <a:avLst/>
+          </a:prstGeom>
+        </p:spPr>
+        <p:txBody>
+          <a:bodyPr>
+            <a:spAutoFit/>
+          </a:bodyPr>
+          <a:lstStyle/>
+          <a:p>
+            <a:r>
+              <a:rPr lang="en-US" dirty="0"/>
+              <a:t>-------------------------------------------</a:t>
+            </a:r>
+          </a:p>
+          <a:p>
+            <a:r>
+              <a:rPr lang="en-US" dirty="0"/>
+              <a:t>Batch: 1</a:t>
+            </a:r>
+          </a:p>
+          <a:p>
+            <a:r>
+              <a:rPr lang="en-US" dirty="0"/>
+              <a:t>-------------------------------------------</a:t>
+            </a:r>
+          </a:p>
+          <a:p>
+            <a:r>
+              <a:rPr lang="en-US" dirty="0"/>
+              <a:t>+-----+---+</a:t>
+            </a:r>
+          </a:p>
+          <a:p>
+            <a:r>
+              <a:rPr lang="en-US" dirty="0"/>
+              <a:t>|value| </a:t>
+            </a:r>
+            <a:r>
+              <a:rPr lang="en-US" dirty="0" err="1"/>
+              <a:t>ts</a:t>
+            </a:r>
+            <a:r>
+              <a:rPr lang="en-US" dirty="0"/>
+              <a:t>|</a:t>
+            </a:r>
+          </a:p>
+          <a:p>
+            <a:r>
+              <a:rPr lang="en-US" dirty="0"/>
+              <a:t>+-----+---+</a:t>
+            </a:r>
+          </a:p>
+          <a:p>
+            <a:r>
+              <a:rPr lang="en-US" dirty="0"/>
+              <a:t>|    1|  1|</a:t>
+            </a:r>
+          </a:p>
+          <a:p>
+            <a:r>
+              <a:rPr lang="en-US" dirty="0"/>
+              <a:t>|    2|  2|</a:t>
+            </a:r>
+          </a:p>
+          <a:p>
+            <a:r>
+              <a:rPr lang="en-US" dirty="0"/>
+              <a:t>+-----+---+</a:t>
+            </a:r>
+            <a:endParaRPr lang="ru-RU" dirty="0"/>
+          </a:p>
+        </p:txBody>
+      </p:sp>
+      <p:sp>
+        <p:nvSpPr>
+          <p:cNvPr id="3" name="Прямоугольник 2"/>
+          <p:cNvSpPr/>
+          <p:nvPr/>
+        </p:nvSpPr>
+        <p:spPr>
+          <a:xfrm>
+            <a:off x="1108668" y="3631365"/>
+            <a:ext cx="6096000" cy="2308324"/>
+          </a:xfrm>
+          <a:prstGeom prst="rect">
+            <a:avLst/>
+          </a:prstGeom>
+        </p:spPr>
+        <p:txBody>
+          <a:bodyPr>
+            <a:spAutoFit/>
+          </a:bodyPr>
+          <a:lstStyle/>
+          <a:p>
+            <a:r>
+              <a:rPr lang="ru-RU" dirty="0" err="1"/>
+              <a:t>Batch</a:t>
+            </a:r>
+            <a:r>
+              <a:rPr lang="ru-RU" dirty="0"/>
+              <a:t>: 4</a:t>
+            </a:r>
+          </a:p>
+          <a:p>
+            <a:r>
+              <a:rPr lang="ru-RU" dirty="0"/>
+              <a:t>-------------------------------------------</a:t>
+            </a:r>
+          </a:p>
+          <a:p>
+            <a:r>
+              <a:rPr lang="ru-RU" dirty="0"/>
+              <a:t>+-----+---+</a:t>
+            </a:r>
+          </a:p>
+          <a:p>
+            <a:r>
+              <a:rPr lang="ru-RU" dirty="0"/>
+              <a:t>|</a:t>
+            </a:r>
+            <a:r>
+              <a:rPr lang="ru-RU" dirty="0" err="1"/>
+              <a:t>value</a:t>
+            </a:r>
+            <a:r>
+              <a:rPr lang="ru-RU" dirty="0"/>
+              <a:t>| </a:t>
+            </a:r>
+            <a:r>
+              <a:rPr lang="ru-RU" dirty="0" err="1"/>
+              <a:t>ts</a:t>
+            </a:r>
+            <a:r>
+              <a:rPr lang="ru-RU" dirty="0"/>
+              <a:t>|</a:t>
+            </a:r>
+          </a:p>
+          <a:p>
+            <a:r>
+              <a:rPr lang="ru-RU" dirty="0"/>
+              <a:t>+-----+---+</a:t>
+            </a:r>
+          </a:p>
+          <a:p>
+            <a:r>
+              <a:rPr lang="ru-RU" dirty="0"/>
+              <a:t>|    1|  1|</a:t>
+            </a:r>
+          </a:p>
+          <a:p>
+            <a:r>
+              <a:rPr lang="ru-RU" dirty="0"/>
+              <a:t>|    2|  2|</a:t>
+            </a:r>
+          </a:p>
+          <a:p>
+            <a:r>
+              <a:rPr lang="ru-RU" dirty="0"/>
+              <a:t>+-----+---+</a:t>
+            </a:r>
+          </a:p>
+        </p:txBody>
+      </p:sp>
+    </p:spTree>
+    <p:extLst>
+      <p:ext uri="{BB962C8B-B14F-4D97-AF65-F5344CB8AC3E}">
+        <p14:creationId xmlns:p14="http://schemas.microsoft.com/office/powerpoint/2010/main" val="3912615266"/>
+      </p:ext>
+    </p:extLst>
+  </p:cSld>
+  <p:clrMapOvr>
+    <a:masterClrMapping/>
+  </p:clrMapOvr>
+  <p:timing>
+    <p:tnLst>
+      <p:par>
+        <p:cTn id="1" dur="indefinite" restart="never" nodeType="tmRoot"/>
+      </p:par>
+    </p:tnLst>
+  </p:timing>
+</p:sld>
+</file>
+
+<file path=ppt/slides/slide13.xml><?xml version="1.0" encoding="utf-8"?>
+<p:sld xmlns:a="http://schemas.openxmlformats.org/drawingml/2006/main" xmlns:r="http://schemas.openxmlformats.org/officeDocument/2006/relationships" xmlns:p="http://schemas.openxmlformats.org/presentationml/2006/main">
+  <p:cSld>
+    <p:spTree>
+      <p:nvGrpSpPr>
+        <p:cNvPr id="1" name=""/>
+        <p:cNvGrpSpPr/>
+        <p:nvPr/>
+      </p:nvGrpSpPr>
+      <p:grpSpPr>
+        <a:xfrm>
+          <a:off x="0" y="0"/>
+          <a:ext cx="0" cy="0"/>
+          <a:chOff x="0" y="0"/>
+          <a:chExt cx="0" cy="0"/>
+        </a:xfrm>
+      </p:grpSpPr>
+      <p:sp>
+        <p:nvSpPr>
           <p:cNvPr id="2" name="Заголовок 1"/>
           <p:cNvSpPr>
             <a:spLocks noGrp="1"/>
@@ -3900,7 +4113,7 @@
 </p:sld>
 </file>
 
-<file path=ppt/slides/slide13.xml><?xml version="1.0" encoding="utf-8"?>
+<file path=ppt/slides/slide14.xml><?xml version="1.0" encoding="utf-8"?>
 <p:sld xmlns:a="http://schemas.openxmlformats.org/drawingml/2006/main" xmlns:r="http://schemas.openxmlformats.org/officeDocument/2006/relationships" xmlns:p="http://schemas.openxmlformats.org/presentationml/2006/main">
   <p:cSld>
     <p:spTree>
@@ -5708,14 +5921,14 @@
       </p:grpSpPr>
       <p:sp>
         <p:nvSpPr>
-          <p:cNvPr id="2" name="Прямоугольник 1"/>
+          <p:cNvPr id="3" name="Прямоугольник 2"/>
           <p:cNvSpPr/>
           <p:nvPr/>
         </p:nvSpPr>
         <p:spPr>
           <a:xfrm>
-            <a:off x="0" y="0"/>
-            <a:ext cx="12192000" cy="7417415"/>
+            <a:off x="80387" y="0"/>
+            <a:ext cx="12191999" cy="6863417"/>
           </a:xfrm>
           <a:prstGeom prst="rect">
             <a:avLst/>
@@ -5728,250 +5941,381 @@
           <a:lstStyle/>
           <a:p>
             <a:r>
-              <a:rPr lang="en-US" sz="2800" dirty="0"/>
+              <a:rPr lang="en-US" sz="2000" dirty="0"/>
               <a:t>class </a:t>
             </a:r>
             <a:r>
-              <a:rPr lang="en-US" sz="2800" dirty="0" err="1"/>
+              <a:rPr lang="en-US" sz="2000" dirty="0" err="1"/>
               <a:t>ConstStreamMicroBatchStream</a:t>
             </a:r>
             <a:r>
-              <a:rPr lang="en-US" sz="2800" dirty="0"/>
+              <a:rPr lang="en-US" sz="2000" dirty="0"/>
               <a:t> extends </a:t>
             </a:r>
             <a:r>
-              <a:rPr lang="en-US" sz="2800" dirty="0" err="1"/>
+              <a:rPr lang="en-US" sz="2000" b="1" dirty="0" err="1"/>
               <a:t>MicroBatchStream</a:t>
             </a:r>
             <a:r>
-              <a:rPr lang="en-US" sz="2800" dirty="0"/>
+              <a:rPr lang="en-US" sz="2000" dirty="0"/>
               <a:t> {</a:t>
             </a:r>
           </a:p>
           <a:p>
             <a:r>
-              <a:rPr lang="en-US" sz="2800" dirty="0"/>
+              <a:rPr lang="en-US" sz="2000" dirty="0"/>
               <a:t>  </a:t>
             </a:r>
             <a:r>
-              <a:rPr lang="en-US" sz="2800" dirty="0" err="1"/>
+              <a:rPr lang="en-US" sz="2000" dirty="0" err="1"/>
               <a:t>var</a:t>
             </a:r>
             <a:r>
-              <a:rPr lang="en-US" sz="2800" dirty="0"/>
+              <a:rPr lang="en-US" sz="2000" dirty="0"/>
               <a:t> </a:t>
             </a:r>
             <a:r>
-              <a:rPr lang="en-US" sz="2800" dirty="0" err="1"/>
+              <a:rPr lang="en-US" sz="2000" dirty="0" err="1"/>
               <a:t>count:Long</a:t>
             </a:r>
             <a:r>
-              <a:rPr lang="en-US" sz="2800" dirty="0"/>
+              <a:rPr lang="en-US" sz="2000" dirty="0"/>
               <a:t> = 0</a:t>
             </a:r>
           </a:p>
           <a:p>
             <a:r>
-              <a:rPr lang="en-US" sz="2800" dirty="0"/>
+              <a:rPr lang="en-US" sz="2000" dirty="0"/>
               <a:t>  override </a:t>
             </a:r>
             <a:r>
-              <a:rPr lang="en-US" sz="2800" dirty="0" err="1"/>
+              <a:rPr lang="en-US" sz="2000" dirty="0" err="1"/>
               <a:t>def</a:t>
             </a:r>
             <a:r>
-              <a:rPr lang="en-US" sz="2800" dirty="0"/>
+              <a:rPr lang="en-US" sz="2000" dirty="0"/>
               <a:t> </a:t>
             </a:r>
             <a:r>
-              <a:rPr lang="en-US" sz="2800" dirty="0" err="1"/>
+              <a:rPr lang="en-US" sz="2000" dirty="0" err="1"/>
               <a:t>latestOffset</a:t>
             </a:r>
             <a:r>
-              <a:rPr lang="en-US" sz="2800" dirty="0"/>
+              <a:rPr lang="en-US" sz="2000" dirty="0"/>
               <a:t>(): Offset = { count +=1; </a:t>
             </a:r>
             <a:r>
-              <a:rPr lang="en-US" sz="2800" dirty="0" err="1"/>
+              <a:rPr lang="en-US" sz="2000" dirty="0" err="1"/>
               <a:t>LongOffset</a:t>
             </a:r>
             <a:r>
-              <a:rPr lang="en-US" sz="2800" dirty="0"/>
+              <a:rPr lang="en-US" sz="2000" dirty="0"/>
               <a:t>(count) }</a:t>
             </a:r>
           </a:p>
           <a:p>
-            <a:endParaRPr lang="en-US" sz="2800" dirty="0"/>
-          </a:p>
-          <a:p>
-            <a:r>
-              <a:rPr lang="en-US" sz="2800" dirty="0"/>
+            <a:endParaRPr lang="en-US" sz="2000" dirty="0"/>
+          </a:p>
+          <a:p>
+            <a:r>
+              <a:rPr lang="en-US" sz="2000" dirty="0"/>
               <a:t>  override </a:t>
             </a:r>
             <a:r>
-              <a:rPr lang="en-US" sz="2800" dirty="0" err="1"/>
+              <a:rPr lang="en-US" sz="2000" dirty="0" err="1"/>
               <a:t>def</a:t>
             </a:r>
             <a:r>
-              <a:rPr lang="en-US" sz="2800" dirty="0"/>
+              <a:rPr lang="en-US" sz="2000" dirty="0"/>
               <a:t> </a:t>
             </a:r>
             <a:r>
-              <a:rPr lang="en-US" sz="2800" dirty="0" err="1"/>
+              <a:rPr lang="en-US" sz="2000" dirty="0" err="1"/>
               <a:t>planInputPartitions</a:t>
             </a:r>
             <a:r>
-              <a:rPr lang="en-US" sz="2800" dirty="0"/>
+              <a:rPr lang="en-US" sz="2000" dirty="0"/>
               <a:t>(start: Offset, end: Offset): Array[</a:t>
             </a:r>
             <a:r>
-              <a:rPr lang="en-US" sz="2800" dirty="0" err="1"/>
+              <a:rPr lang="en-US" sz="2000" dirty="0" err="1"/>
               <a:t>InputPartition</a:t>
             </a:r>
             <a:r>
-              <a:rPr lang="en-US" sz="2800" dirty="0"/>
-              <a:t>] = ???</a:t>
-            </a:r>
-          </a:p>
-          <a:p>
-            <a:endParaRPr lang="en-US" sz="2800" dirty="0"/>
-          </a:p>
-          <a:p>
-            <a:r>
-              <a:rPr lang="en-US" sz="2800" dirty="0"/>
+              <a:rPr lang="en-US" sz="2000" dirty="0"/>
+              <a:t>] =  Array(</a:t>
+            </a:r>
+            <a:r>
+              <a:rPr lang="en-US" sz="2000" dirty="0" err="1"/>
+              <a:t>ConstStreamMicroBatchStreamInputPartition</a:t>
+            </a:r>
+            <a:r>
+              <a:rPr lang="en-US" sz="2000" dirty="0"/>
+              <a:t>(1))</a:t>
+            </a:r>
+          </a:p>
+          <a:p>
+            <a:endParaRPr lang="en-US" sz="2000" dirty="0"/>
+          </a:p>
+          <a:p>
+            <a:r>
+              <a:rPr lang="en-US" sz="2000" dirty="0"/>
               <a:t>  override </a:t>
             </a:r>
             <a:r>
-              <a:rPr lang="en-US" sz="2800" dirty="0" err="1"/>
+              <a:rPr lang="en-US" sz="2000" dirty="0" err="1"/>
               <a:t>def</a:t>
             </a:r>
             <a:r>
-              <a:rPr lang="en-US" sz="2800" dirty="0"/>
+              <a:rPr lang="en-US" sz="2000" dirty="0"/>
               <a:t> </a:t>
             </a:r>
             <a:r>
-              <a:rPr lang="en-US" sz="2800" dirty="0" err="1"/>
+              <a:rPr lang="en-US" sz="2000" dirty="0" err="1"/>
               <a:t>createReaderFactory</a:t>
             </a:r>
             <a:r>
-              <a:rPr lang="en-US" sz="2800" dirty="0"/>
+              <a:rPr lang="en-US" sz="2000" dirty="0"/>
               <a:t>(): </a:t>
             </a:r>
             <a:r>
-              <a:rPr lang="en-US" sz="2800" dirty="0" err="1"/>
+              <a:rPr lang="en-US" sz="2000" dirty="0" err="1"/>
               <a:t>PartitionReaderFactory</a:t>
             </a:r>
             <a:r>
-              <a:rPr lang="en-US" sz="2800" dirty="0"/>
-              <a:t> = ???</a:t>
-            </a:r>
-          </a:p>
-          <a:p>
-            <a:endParaRPr lang="en-US" sz="2800" dirty="0"/>
-          </a:p>
-          <a:p>
-            <a:r>
-              <a:rPr lang="en-US" sz="2800" dirty="0"/>
+              <a:rPr lang="en-US" sz="2000" dirty="0"/>
+              <a:t> = {</a:t>
+            </a:r>
+          </a:p>
+          <a:p>
+            <a:r>
+              <a:rPr lang="en-US" sz="2000" dirty="0"/>
+              <a:t>    new </a:t>
+            </a:r>
+            <a:r>
+              <a:rPr lang="en-US" sz="2000" dirty="0" err="1"/>
+              <a:t>PartitionReaderFactory</a:t>
+            </a:r>
+            <a:r>
+              <a:rPr lang="en-US" sz="2000" dirty="0"/>
+              <a:t>(){</a:t>
+            </a:r>
+          </a:p>
+          <a:p>
+            <a:r>
+              <a:rPr lang="en-US" sz="2000" dirty="0"/>
+              <a:t>      override </a:t>
+            </a:r>
+            <a:r>
+              <a:rPr lang="en-US" sz="2000" dirty="0" err="1"/>
+              <a:t>def</a:t>
+            </a:r>
+            <a:r>
+              <a:rPr lang="en-US" sz="2000" dirty="0"/>
+              <a:t> </a:t>
+            </a:r>
+            <a:r>
+              <a:rPr lang="en-US" sz="2000" dirty="0" err="1"/>
+              <a:t>createReader</a:t>
+            </a:r>
+            <a:r>
+              <a:rPr lang="en-US" sz="2000" dirty="0"/>
+              <a:t>(partition: </a:t>
+            </a:r>
+            <a:r>
+              <a:rPr lang="en-US" sz="2000" dirty="0" err="1"/>
+              <a:t>InputPartition</a:t>
+            </a:r>
+            <a:r>
+              <a:rPr lang="en-US" sz="2000" dirty="0"/>
+              <a:t>): </a:t>
+            </a:r>
+            <a:r>
+              <a:rPr lang="en-US" sz="2000" dirty="0" err="1"/>
+              <a:t>PartitionReader</a:t>
+            </a:r>
+            <a:r>
+              <a:rPr lang="en-US" sz="2000" dirty="0"/>
+              <a:t>[</a:t>
+            </a:r>
+            <a:r>
+              <a:rPr lang="en-US" sz="2000" dirty="0" err="1"/>
+              <a:t>InternalRow</a:t>
+            </a:r>
+            <a:r>
+              <a:rPr lang="en-US" sz="2000" dirty="0"/>
+              <a:t>] = {</a:t>
+            </a:r>
+          </a:p>
+          <a:p>
+            <a:r>
+              <a:rPr lang="en-US" sz="2000" dirty="0"/>
+              <a:t>        new </a:t>
+            </a:r>
+            <a:r>
+              <a:rPr lang="en-US" sz="2000" dirty="0" err="1"/>
+              <a:t>ConstStreamMicroBatchPartitionReader</a:t>
+            </a:r>
+            <a:r>
+              <a:rPr lang="en-US" sz="2000" dirty="0"/>
+              <a:t>()</a:t>
+            </a:r>
+          </a:p>
+          <a:p>
+            <a:r>
+              <a:rPr lang="en-US" sz="2000" dirty="0"/>
+              <a:t>      }</a:t>
+            </a:r>
+          </a:p>
+          <a:p>
+            <a:r>
+              <a:rPr lang="en-US" sz="2000" dirty="0"/>
+              <a:t>    }</a:t>
+            </a:r>
+          </a:p>
+          <a:p>
+            <a:r>
+              <a:rPr lang="en-US" sz="2000" dirty="0"/>
+              <a:t>  }</a:t>
+            </a:r>
+          </a:p>
+          <a:p>
+            <a:r>
+              <a:rPr lang="en-US" sz="2000" dirty="0" smtClean="0"/>
+              <a:t>  </a:t>
+            </a:r>
+            <a:r>
+              <a:rPr lang="en-US" sz="2000" dirty="0"/>
+              <a:t>override </a:t>
+            </a:r>
+            <a:r>
+              <a:rPr lang="en-US" sz="2000" dirty="0" err="1"/>
+              <a:t>def</a:t>
+            </a:r>
+            <a:r>
+              <a:rPr lang="en-US" sz="2000" dirty="0"/>
+              <a:t> </a:t>
+            </a:r>
+            <a:r>
+              <a:rPr lang="en-US" sz="2000" dirty="0" err="1"/>
+              <a:t>initialOffset</a:t>
+            </a:r>
+            <a:r>
+              <a:rPr lang="en-US" sz="2000" dirty="0"/>
+              <a:t>(): Offset = </a:t>
+            </a:r>
+            <a:r>
+              <a:rPr lang="en-US" sz="2000" dirty="0" err="1"/>
+              <a:t>LongOffset</a:t>
+            </a:r>
+            <a:r>
+              <a:rPr lang="en-US" sz="2000" dirty="0"/>
+              <a:t>(0)</a:t>
+            </a:r>
+          </a:p>
+          <a:p>
+            <a:endParaRPr lang="en-US" sz="2000" dirty="0"/>
+          </a:p>
+          <a:p>
+            <a:r>
+              <a:rPr lang="en-US" sz="2000" dirty="0"/>
               <a:t>  override </a:t>
             </a:r>
             <a:r>
-              <a:rPr lang="en-US" sz="2800" dirty="0" err="1"/>
+              <a:rPr lang="en-US" sz="2000" dirty="0" err="1"/>
               <a:t>def</a:t>
             </a:r>
             <a:r>
-              <a:rPr lang="en-US" sz="2800" dirty="0"/>
+              <a:rPr lang="en-US" sz="2000" dirty="0"/>
               <a:t> </a:t>
             </a:r>
             <a:r>
-              <a:rPr lang="en-US" sz="2800" dirty="0" err="1"/>
-              <a:t>initialOffset</a:t>
-            </a:r>
-            <a:r>
-              <a:rPr lang="en-US" sz="2800" dirty="0"/>
-              <a:t>(): Offset = </a:t>
-            </a:r>
-            <a:r>
-              <a:rPr lang="en-US" sz="2800" dirty="0" err="1"/>
+              <a:rPr lang="en-US" sz="2000" dirty="0" err="1"/>
+              <a:t>deserializeOffset</a:t>
+            </a:r>
+            <a:r>
+              <a:rPr lang="en-US" sz="2000" dirty="0"/>
+              <a:t>(</a:t>
+            </a:r>
+            <a:r>
+              <a:rPr lang="en-US" sz="2000" dirty="0" err="1"/>
+              <a:t>json</a:t>
+            </a:r>
+            <a:r>
+              <a:rPr lang="en-US" sz="2000" dirty="0"/>
+              <a:t>: String): Offset = {</a:t>
+            </a:r>
+          </a:p>
+          <a:p>
+            <a:r>
+              <a:rPr lang="en-US" sz="2000" dirty="0"/>
+              <a:t>    </a:t>
+            </a:r>
+            <a:r>
+              <a:rPr lang="en-US" sz="2000" dirty="0" err="1"/>
               <a:t>LongOffset</a:t>
             </a:r>
             <a:r>
-              <a:rPr lang="en-US" sz="2800" dirty="0"/>
-              <a:t>(0)</a:t>
-            </a:r>
-          </a:p>
-          <a:p>
-            <a:endParaRPr lang="en-US" sz="2800" dirty="0"/>
-          </a:p>
-          <a:p>
-            <a:r>
-              <a:rPr lang="en-US" sz="2800" dirty="0"/>
-              <a:t>  override </a:t>
-            </a:r>
-            <a:r>
-              <a:rPr lang="en-US" sz="2800" dirty="0" err="1"/>
+              <a:rPr lang="en-US" sz="2000" dirty="0"/>
+              <a:t>(</a:t>
+            </a:r>
+            <a:r>
+              <a:rPr lang="en-US" sz="2000" dirty="0" err="1"/>
+              <a:t>json.toLong</a:t>
+            </a:r>
+            <a:r>
+              <a:rPr lang="en-US" sz="2000" dirty="0"/>
+              <a:t>)</a:t>
+            </a:r>
+          </a:p>
+          <a:p>
+            <a:r>
+              <a:rPr lang="en-US" sz="2000" dirty="0"/>
+              <a:t>  }</a:t>
+            </a:r>
+          </a:p>
+          <a:p>
+            <a:r>
+              <a:rPr lang="en-US" sz="2000" dirty="0" smtClean="0"/>
+              <a:t>  </a:t>
+            </a:r>
+            <a:r>
+              <a:rPr lang="en-US" sz="2000" dirty="0"/>
+              <a:t>override </a:t>
+            </a:r>
+            <a:r>
+              <a:rPr lang="en-US" sz="2000" dirty="0" err="1"/>
               <a:t>def</a:t>
             </a:r>
             <a:r>
-              <a:rPr lang="en-US" sz="2800" dirty="0"/>
-              <a:t> </a:t>
-            </a:r>
-            <a:r>
-              <a:rPr lang="en-US" sz="2800" dirty="0" err="1"/>
-              <a:t>deserializeOffset</a:t>
-            </a:r>
-            <a:r>
-              <a:rPr lang="en-US" sz="2800" dirty="0"/>
-              <a:t>(</a:t>
-            </a:r>
-            <a:r>
-              <a:rPr lang="en-US" sz="2800" dirty="0" err="1"/>
-              <a:t>json</a:t>
-            </a:r>
-            <a:r>
-              <a:rPr lang="en-US" sz="2800" dirty="0"/>
-              <a:t>: String): Offset = ???</a:t>
-            </a:r>
-          </a:p>
-          <a:p>
-            <a:endParaRPr lang="en-US" sz="2800" dirty="0"/>
-          </a:p>
-          <a:p>
-            <a:r>
-              <a:rPr lang="en-US" sz="2800" dirty="0"/>
-              <a:t>  override </a:t>
-            </a:r>
-            <a:r>
-              <a:rPr lang="en-US" sz="2800" dirty="0" err="1"/>
+              <a:rPr lang="en-US" sz="2000" dirty="0"/>
+              <a:t> commit(end: Offset): Unit = {}</a:t>
+            </a:r>
+          </a:p>
+          <a:p>
+            <a:r>
+              <a:rPr lang="en-US" sz="2000" dirty="0" smtClean="0"/>
+              <a:t>  </a:t>
+            </a:r>
+            <a:r>
+              <a:rPr lang="en-US" sz="2000" dirty="0"/>
+              <a:t>override </a:t>
+            </a:r>
+            <a:r>
+              <a:rPr lang="en-US" sz="2000" dirty="0" err="1"/>
               <a:t>def</a:t>
             </a:r>
             <a:r>
-              <a:rPr lang="en-US" sz="2800" dirty="0"/>
-              <a:t> commit(end: Offset): Unit = ???</a:t>
-            </a:r>
-          </a:p>
-          <a:p>
-            <a:endParaRPr lang="en-US" sz="2800" dirty="0"/>
-          </a:p>
-          <a:p>
-            <a:r>
-              <a:rPr lang="en-US" sz="2800" dirty="0"/>
-              <a:t>  override </a:t>
-            </a:r>
-            <a:r>
-              <a:rPr lang="en-US" sz="2800" dirty="0" err="1"/>
-              <a:t>def</a:t>
-            </a:r>
-            <a:r>
-              <a:rPr lang="en-US" sz="2800" dirty="0"/>
+              <a:rPr lang="en-US" sz="2000" dirty="0"/>
               <a:t> stop(): Unit = ???</a:t>
             </a:r>
           </a:p>
           <a:p>
             <a:r>
-              <a:rPr lang="en-US" sz="2800" dirty="0"/>
+              <a:rPr lang="en-US" sz="2000" dirty="0"/>
               <a:t>}</a:t>
             </a:r>
-            <a:endParaRPr lang="ru-RU" sz="2800" dirty="0"/>
+            <a:endParaRPr lang="ru-RU" sz="2000" dirty="0"/>
           </a:p>
         </p:txBody>
       </p:sp>

</xml_diff>